<commit_message>
Finished up Caledon Forest and outline for Metrica
</commit_message>
<xml_diff>
--- a/GW2 Heros Journey - wf.pptx
+++ b/GW2 Heros Journey - wf.pptx
@@ -7,9 +7,8 @@
   <p:sldIdLst>
     <p:sldId id="256" r:id="rId2"/>
     <p:sldId id="263" r:id="rId3"/>
-    <p:sldId id="261" r:id="rId4"/>
-    <p:sldId id="259" r:id="rId5"/>
-    <p:sldId id="260" r:id="rId6"/>
+    <p:sldId id="259" r:id="rId4"/>
+    <p:sldId id="260" r:id="rId5"/>
   </p:sldIdLst>
   <p:sldSz cx="12192000" cy="6858000"/>
   <p:notesSz cx="6858000" cy="9144000"/>
@@ -291,7 +290,7 @@
           <a:p>
             <a:fld id="{E908CF19-BBB9-45F0-B426-1C49897CD9DC}" type="datetimeFigureOut">
               <a:rPr lang="en-US" smtClean="0"/>
-              <a:t>8/3/2025</a:t>
+              <a:t>8/6/2025</a:t>
             </a:fld>
             <a:endParaRPr lang="en-US" dirty="0"/>
           </a:p>
@@ -489,7 +488,7 @@
           <a:p>
             <a:fld id="{E908CF19-BBB9-45F0-B426-1C49897CD9DC}" type="datetimeFigureOut">
               <a:rPr lang="en-US" smtClean="0"/>
-              <a:t>8/3/2025</a:t>
+              <a:t>8/6/2025</a:t>
             </a:fld>
             <a:endParaRPr lang="en-US" dirty="0"/>
           </a:p>
@@ -697,7 +696,7 @@
           <a:p>
             <a:fld id="{E908CF19-BBB9-45F0-B426-1C49897CD9DC}" type="datetimeFigureOut">
               <a:rPr lang="en-US" smtClean="0"/>
-              <a:t>8/3/2025</a:t>
+              <a:t>8/6/2025</a:t>
             </a:fld>
             <a:endParaRPr lang="en-US" dirty="0"/>
           </a:p>
@@ -895,7 +894,7 @@
           <a:p>
             <a:fld id="{E908CF19-BBB9-45F0-B426-1C49897CD9DC}" type="datetimeFigureOut">
               <a:rPr lang="en-US" smtClean="0"/>
-              <a:t>8/3/2025</a:t>
+              <a:t>8/6/2025</a:t>
             </a:fld>
             <a:endParaRPr lang="en-US" dirty="0"/>
           </a:p>
@@ -1170,7 +1169,7 @@
           <a:p>
             <a:fld id="{E908CF19-BBB9-45F0-B426-1C49897CD9DC}" type="datetimeFigureOut">
               <a:rPr lang="en-US" smtClean="0"/>
-              <a:t>8/3/2025</a:t>
+              <a:t>8/6/2025</a:t>
             </a:fld>
             <a:endParaRPr lang="en-US" dirty="0"/>
           </a:p>
@@ -1435,7 +1434,7 @@
           <a:p>
             <a:fld id="{E908CF19-BBB9-45F0-B426-1C49897CD9DC}" type="datetimeFigureOut">
               <a:rPr lang="en-US" smtClean="0"/>
-              <a:t>8/3/2025</a:t>
+              <a:t>8/6/2025</a:t>
             </a:fld>
             <a:endParaRPr lang="en-US" dirty="0"/>
           </a:p>
@@ -1847,7 +1846,7 @@
           <a:p>
             <a:fld id="{E908CF19-BBB9-45F0-B426-1C49897CD9DC}" type="datetimeFigureOut">
               <a:rPr lang="en-US" smtClean="0"/>
-              <a:t>8/3/2025</a:t>
+              <a:t>8/6/2025</a:t>
             </a:fld>
             <a:endParaRPr lang="en-US" dirty="0"/>
           </a:p>
@@ -1988,7 +1987,7 @@
           <a:p>
             <a:fld id="{E908CF19-BBB9-45F0-B426-1C49897CD9DC}" type="datetimeFigureOut">
               <a:rPr lang="en-US" smtClean="0"/>
-              <a:t>8/3/2025</a:t>
+              <a:t>8/6/2025</a:t>
             </a:fld>
             <a:endParaRPr lang="en-US" dirty="0"/>
           </a:p>
@@ -2101,7 +2100,7 @@
           <a:p>
             <a:fld id="{E908CF19-BBB9-45F0-B426-1C49897CD9DC}" type="datetimeFigureOut">
               <a:rPr lang="en-US" smtClean="0"/>
-              <a:t>8/3/2025</a:t>
+              <a:t>8/6/2025</a:t>
             </a:fld>
             <a:endParaRPr lang="en-US" dirty="0"/>
           </a:p>
@@ -2412,7 +2411,7 @@
           <a:p>
             <a:fld id="{E908CF19-BBB9-45F0-B426-1C49897CD9DC}" type="datetimeFigureOut">
               <a:rPr lang="en-US" smtClean="0"/>
-              <a:t>8/3/2025</a:t>
+              <a:t>8/6/2025</a:t>
             </a:fld>
             <a:endParaRPr lang="en-US" dirty="0"/>
           </a:p>
@@ -2700,7 +2699,7 @@
           <a:p>
             <a:fld id="{E908CF19-BBB9-45F0-B426-1C49897CD9DC}" type="datetimeFigureOut">
               <a:rPr lang="en-US" smtClean="0"/>
-              <a:t>8/3/2025</a:t>
+              <a:t>8/6/2025</a:t>
             </a:fld>
             <a:endParaRPr lang="en-US" dirty="0"/>
           </a:p>
@@ -2941,7 +2940,7 @@
           <a:p>
             <a:fld id="{E908CF19-BBB9-45F0-B426-1C49897CD9DC}" type="datetimeFigureOut">
               <a:rPr lang="en-US" smtClean="0"/>
-              <a:t>8/3/2025</a:t>
+              <a:t>8/6/2025</a:t>
             </a:fld>
             <a:endParaRPr lang="en-US" dirty="0"/>
           </a:p>
@@ -3489,7 +3488,7 @@
             <a:pPr algn="ctr"/>
             <a:r>
               <a:rPr lang="en-US" sz="600" dirty="0"/>
-              <a:t>8</a:t>
+              <a:t>9</a:t>
             </a:r>
           </a:p>
         </p:txBody>
@@ -3508,7 +3507,7 @@
         </p:nvSpPr>
         <p:spPr>
           <a:xfrm>
-            <a:off x="1879125" y="5488420"/>
+            <a:off x="1892488" y="5402816"/>
             <a:ext cx="381000" cy="381000"/>
           </a:xfrm>
           <a:prstGeom prst="ellipse">
@@ -3704,7 +3703,7 @@
         </p:nvSpPr>
         <p:spPr>
           <a:xfrm>
-            <a:off x="1970764" y="3943012"/>
+            <a:off x="2388314" y="4123843"/>
             <a:ext cx="381000" cy="381000"/>
           </a:xfrm>
           <a:prstGeom prst="ellipse">
@@ -3734,7 +3733,7 @@
             <a:pPr algn="ctr"/>
             <a:r>
               <a:rPr lang="en-US" sz="600" dirty="0"/>
-              <a:t>5</a:t>
+              <a:t>6</a:t>
             </a:r>
           </a:p>
         </p:txBody>
@@ -3783,7 +3782,7 @@
             <a:pPr algn="ctr"/>
             <a:r>
               <a:rPr lang="en-US" sz="600" dirty="0"/>
-              <a:t>6</a:t>
+              <a:t>7</a:t>
             </a:r>
           </a:p>
         </p:txBody>
@@ -3832,7 +3831,7 @@
             <a:pPr algn="ctr"/>
             <a:r>
               <a:rPr lang="en-US" sz="600" dirty="0"/>
-              <a:t>7</a:t>
+              <a:t>8</a:t>
             </a:r>
           </a:p>
         </p:txBody>
@@ -3851,7 +3850,7 @@
         </p:nvSpPr>
         <p:spPr>
           <a:xfrm>
-            <a:off x="2407173" y="2942542"/>
+            <a:off x="2439018" y="2872194"/>
             <a:ext cx="381000" cy="381000"/>
           </a:xfrm>
           <a:prstGeom prst="ellipse">
@@ -3881,7 +3880,7 @@
             <a:pPr algn="ctr"/>
             <a:r>
               <a:rPr lang="en-US" sz="600" dirty="0"/>
-              <a:t>9</a:t>
+              <a:t>10</a:t>
             </a:r>
           </a:p>
         </p:txBody>
@@ -3930,7 +3929,7 @@
             <a:pPr algn="ctr"/>
             <a:r>
               <a:rPr lang="en-US" sz="600" dirty="0"/>
-              <a:t>16</a:t>
+              <a:t>18</a:t>
             </a:r>
           </a:p>
         </p:txBody>
@@ -3979,7 +3978,7 @@
             <a:pPr algn="ctr"/>
             <a:r>
               <a:rPr lang="en-US" sz="600" dirty="0"/>
-              <a:t>12</a:t>
+              <a:t>16</a:t>
             </a:r>
           </a:p>
         </p:txBody>
@@ -4028,7 +4027,7 @@
             <a:pPr algn="ctr"/>
             <a:r>
               <a:rPr lang="en-US" sz="600" dirty="0"/>
-              <a:t>13</a:t>
+              <a:t>15</a:t>
             </a:r>
           </a:p>
         </p:txBody>
@@ -4126,7 +4125,7 @@
             <a:pPr algn="ctr"/>
             <a:r>
               <a:rPr lang="en-US" sz="600" dirty="0"/>
-              <a:t>15</a:t>
+              <a:t>17</a:t>
             </a:r>
           </a:p>
         </p:txBody>
@@ -4175,7 +4174,7 @@
             <a:pPr algn="ctr"/>
             <a:r>
               <a:rPr lang="en-US" sz="600" dirty="0"/>
-              <a:t>17</a:t>
+              <a:t>19</a:t>
             </a:r>
           </a:p>
         </p:txBody>
@@ -4194,8 +4193,8 @@
         </p:nvSpPr>
         <p:spPr>
           <a:xfrm>
-            <a:off x="5311140" y="463170"/>
-            <a:ext cx="7686720" cy="1938992"/>
+            <a:off x="3911700" y="215417"/>
+            <a:ext cx="8201383" cy="2677656"/>
           </a:xfrm>
           <a:prstGeom prst="rect">
             <a:avLst/>
@@ -4203,151 +4202,287 @@
           <a:noFill/>
         </p:spPr>
         <p:txBody>
-          <a:bodyPr wrap="none" rtlCol="0">
+          <a:bodyPr wrap="square" rtlCol="0">
             <a:spAutoFit/>
           </a:bodyPr>
           <a:lstStyle/>
           <a:p>
             <a:r>
               <a:rPr lang="en-US" sz="800" dirty="0"/>
-              <a:t>1-dream and </a:t>
+              <a:t>1-welcome slayer, spread the tale of your victory to the other shamans</a:t>
+            </a:r>
+          </a:p>
+          <a:p>
+            <a:r>
+              <a:rPr lang="en-US" sz="800" dirty="0"/>
+              <a:t>2-look at you, adding glory to your tale, check on wolf next</a:t>
+            </a:r>
+          </a:p>
+          <a:p>
+            <a:r>
+              <a:rPr lang="en-US" sz="800" dirty="0"/>
+              <a:t>3-what wolf is fending off a </a:t>
             </a:r>
             <a:r>
               <a:rPr lang="en-US" sz="800" dirty="0" err="1"/>
-              <a:t>wyldf</a:t>
+              <a:t>Svanir</a:t>
             </a:r>
             <a:r>
               <a:rPr lang="en-US" sz="800" dirty="0"/>
-              <a:t> hunt was disturbing, check on locals</a:t>
+              <a:t> attack? Head south and find where they have gained a foothold</a:t>
             </a:r>
           </a:p>
           <a:p>
             <a:r>
               <a:rPr lang="en-US" sz="800" dirty="0"/>
-              <a:t>2-pups seem to be fine, go check for with </a:t>
+              <a:t>4-a bloody dragon totem. And what is this? An attack on bear? Quickly we must not let another spirit fall</a:t>
             </a:r>
           </a:p>
           <a:p>
             <a:r>
               <a:rPr lang="en-US" sz="800" dirty="0"/>
-              <a:t>3-undead filth, look for source of the undead</a:t>
+              <a:t>5-hrmm this splinter group must have come from somewhere, head through the northern pass and lets see if we can find their camp</a:t>
             </a:r>
           </a:p>
           <a:p>
             <a:r>
               <a:rPr lang="en-US" sz="800" dirty="0"/>
-              <a:t>4-some of these corpses are nightmare court. There must be a hidden base nearby</a:t>
-            </a:r>
-          </a:p>
-          <a:p>
+              <a:t>6- look there to the east, I see </a:t>
+            </a:r>
+            <a:r>
+              <a:rPr lang="en-US" sz="800" dirty="0" err="1"/>
+              <a:t>savnir</a:t>
+            </a:r>
             <a:r>
               <a:rPr lang="en-US" sz="800" dirty="0"/>
-              <a:t>5-more undead, keep checking northing</a:t>
+              <a:t> along the ridge, Lets go and show them what it means to betray the spirits</a:t>
             </a:r>
           </a:p>
           <a:p>
             <a:r>
               <a:rPr lang="en-US" sz="800" dirty="0"/>
-              <a:t>6-found a hidden entrance but cant get in. keep </a:t>
+              <a:t>7- Plans for an unholy abomination, quickly we must head to ravens nest and recover an artifact to take down the beast</a:t>
+            </a:r>
+          </a:p>
+          <a:p>
+            <a:r>
+              <a:rPr lang="en-US" sz="800" dirty="0"/>
+              <a:t>8- ahh ravens nest. A vault? A rite of passage? Either way, we must get that artifact</a:t>
+            </a:r>
+          </a:p>
+          <a:p>
+            <a:r>
+              <a:rPr lang="en-US" sz="800" dirty="0"/>
+              <a:t>9-get anything from that chest? </a:t>
             </a:r>
             <a:r>
               <a:rPr lang="en-US" sz="800" dirty="0" err="1"/>
-              <a:t>chjecking</a:t>
+              <a:t>Hrmm</a:t>
             </a:r>
             <a:r>
               <a:rPr lang="en-US" sz="800" dirty="0"/>
-              <a:t> north</a:t>
-            </a:r>
-          </a:p>
-          <a:p>
+              <a:t>, broken?  let me have it. Lets take it over to </a:t>
+            </a:r>
+            <a:r>
+              <a:rPr lang="en-US" sz="800" dirty="0" err="1"/>
+              <a:t>Twinspur</a:t>
+            </a:r>
             <a:r>
               <a:rPr lang="en-US" sz="800" dirty="0"/>
-              <a:t>7-meet frogs, no mention of nightmare court, head west along shore to </a:t>
+              <a:t> Haven to see if someone can repair it. gear up to take it to the </a:t>
             </a:r>
             <a:r>
               <a:rPr lang="en-US" sz="800" dirty="0" err="1"/>
-              <a:t>sherriff</a:t>
+              <a:t>savnir</a:t>
             </a:r>
             <a:endParaRPr lang="en-US" sz="800" dirty="0"/>
           </a:p>
           <a:p>
             <a:r>
               <a:rPr lang="en-US" sz="800" dirty="0"/>
-              <a:t>8-talk to sheriff </a:t>
+              <a:t>10- I found someone who can repair it, but they need ore from the mine? Good, lets start by checking on the mine to the north west. </a:t>
+            </a:r>
+          </a:p>
+          <a:p>
+            <a:r>
+              <a:rPr lang="en-US" sz="800" dirty="0"/>
+              <a:t>11-dredge, what pests. Well lets see if we can go “recover” some metal from their grasp.</a:t>
+            </a:r>
+          </a:p>
+          <a:p>
+            <a:r>
+              <a:rPr lang="en-US" sz="800" dirty="0"/>
+              <a:t>12- Good I was able to get some </a:t>
             </a:r>
             <a:r>
               <a:rPr lang="en-US" sz="800" dirty="0" err="1"/>
-              <a:t>nora</a:t>
+              <a:t>processe</a:t>
             </a:r>
             <a:r>
               <a:rPr lang="en-US" sz="800" dirty="0"/>
-              <a:t>, look for a key to entrance</a:t>
-            </a:r>
-          </a:p>
-          <a:p>
+              <a:t> ore. Ill head over to </a:t>
+            </a:r>
+            <a:r>
+              <a:rPr lang="en-US" sz="800" dirty="0" err="1"/>
+              <a:t>Edenvar’s</a:t>
+            </a:r>
             <a:r>
               <a:rPr lang="en-US" sz="800" dirty="0"/>
-              <a:t>9-didn’t find key but found note about forces building in the bog. Head to </a:t>
+              <a:t> and see if we can find a runner. </a:t>
+            </a:r>
+          </a:p>
+          <a:p>
+            <a:r>
+              <a:rPr lang="en-US" sz="800" dirty="0"/>
+              <a:t>13-I was able to get one of these mercs to carry the ore back. They mentioned </a:t>
             </a:r>
             <a:r>
               <a:rPr lang="en-US" sz="800" dirty="0" err="1"/>
-              <a:t>mabon’s</a:t>
+              <a:t>savnir</a:t>
             </a:r>
             <a:r>
               <a:rPr lang="en-US" sz="800" dirty="0"/>
-              <a:t> terrace to prep</a:t>
+              <a:t> just to the north east, lets quickly head over and bust some skulls</a:t>
             </a:r>
           </a:p>
           <a:p>
             <a:r>
               <a:rPr lang="en-US" sz="800" dirty="0"/>
-              <a:t>10- Guard mentions Tovar going west to kill nightmare court</a:t>
-            </a:r>
-          </a:p>
-          <a:p>
+              <a:t>14-Good, one less </a:t>
+            </a:r>
+            <a:r>
+              <a:rPr lang="en-US" sz="800" dirty="0" err="1"/>
+              <a:t>savnir</a:t>
+            </a:r>
             <a:r>
               <a:rPr lang="en-US" sz="800" dirty="0"/>
-              <a:t>11-Tovar complains about the </a:t>
+              <a:t> means one less headache. Lets see if </a:t>
             </a:r>
             <a:r>
               <a:rPr lang="en-US" sz="800" dirty="0" err="1"/>
-              <a:t>skritt</a:t>
+              <a:t>Krennak</a:t>
             </a:r>
             <a:r>
               <a:rPr lang="en-US" sz="800" dirty="0"/>
-              <a:t> stealing something the NC had and would like us to retrieve it</a:t>
+              <a:t> needs a hand. </a:t>
             </a:r>
           </a:p>
           <a:p>
             <a:r>
               <a:rPr lang="en-US" sz="800" dirty="0"/>
-              <a:t>12-get through hidden door, was there anything in that chest worthwhile? I took this bloody thorn, nasty thing. Lets take it to trader’s green to report it in</a:t>
+              <a:t>15-An ice giant? Hang around to see if you want to add another scar to your legend or lets move on another lead to the east.</a:t>
             </a:r>
           </a:p>
           <a:p>
             <a:r>
               <a:rPr lang="en-US" sz="800" dirty="0"/>
-              <a:t>13-you smell that in the air, what a putrid stench. Since we turned over the thorn, lets head north. Nothing good can come from that</a:t>
-            </a:r>
-          </a:p>
-          <a:p>
+              <a:t>16- a corrupted spike? This only comes from a creature </a:t>
+            </a:r>
+            <a:r>
+              <a:rPr lang="en-US" sz="800" dirty="0" err="1"/>
+              <a:t>whos</a:t>
+            </a:r>
             <a:r>
               <a:rPr lang="en-US" sz="800" dirty="0"/>
-              <a:t>14-the NC were trying to harness the power of the jungle worm?!? Outrageous. To have enough power </a:t>
+              <a:t> soul has been tormented by </a:t>
             </a:r>
             <a:r>
               <a:rPr lang="en-US" sz="800" dirty="0" err="1"/>
-              <a:t>todo</a:t>
+              <a:t>Jormag</a:t>
             </a:r>
             <a:r>
               <a:rPr lang="en-US" sz="800" dirty="0"/>
-              <a:t> that must mean their main base is around here somewhere</a:t>
-            </a:r>
-          </a:p>
-          <a:p>
+              <a:t>. Quickly! We must find and put down this beast. There was </a:t>
+            </a:r>
+            <a:r>
+              <a:rPr lang="en-US" sz="800" dirty="0" err="1"/>
+              <a:t>Lionguard</a:t>
+            </a:r>
             <a:r>
               <a:rPr lang="en-US" sz="800" dirty="0"/>
-              <a:t>15-Good, we’ve found the entrance but still need to prepare a few things. While we do that, head north east and see if Zinder slope has been effected</a:t>
+              <a:t> outpost just north of the </a:t>
+            </a:r>
+            <a:r>
+              <a:rPr lang="en-US" sz="800" dirty="0" err="1"/>
+              <a:t>wurm</a:t>
+            </a:r>
+            <a:r>
+              <a:rPr lang="en-US" sz="800" dirty="0"/>
+              <a:t> cave. Lets see if they know about anything</a:t>
+            </a:r>
+          </a:p>
+          <a:p>
+            <a:r>
+              <a:rPr lang="en-US" sz="800" dirty="0"/>
+              <a:t>17-Whispers and screams in the night roll off the hills of the once great </a:t>
+            </a:r>
+            <a:r>
+              <a:rPr lang="en-US" sz="800" dirty="0" err="1"/>
+              <a:t>Dragonblest</a:t>
+            </a:r>
+            <a:r>
+              <a:rPr lang="en-US" sz="800" dirty="0"/>
+              <a:t>.  We must push into the ruined town and see if we can stop whatever </a:t>
+            </a:r>
+            <a:r>
+              <a:rPr lang="en-US" sz="800" dirty="0" err="1"/>
+              <a:t>Jormag</a:t>
+            </a:r>
+            <a:r>
+              <a:rPr lang="en-US" sz="800" dirty="0"/>
+              <a:t> has been doing</a:t>
+            </a:r>
+          </a:p>
+          <a:p>
+            <a:r>
+              <a:rPr lang="en-US" sz="800" dirty="0"/>
+              <a:t>18-what a foul creature and look here, the corruption of </a:t>
+            </a:r>
+            <a:r>
+              <a:rPr lang="en-US" sz="800" dirty="0" err="1"/>
+              <a:t>Jormag</a:t>
+            </a:r>
+            <a:r>
+              <a:rPr lang="en-US" sz="800" dirty="0"/>
+              <a:t>.  Lets hope that this slows down the spread of any more corrupted shards.  The once great ruler of this hovel fell, so close to our capital.  Lets head west and see how bad </a:t>
+            </a:r>
+            <a:r>
+              <a:rPr lang="en-US" sz="800" dirty="0" err="1"/>
+              <a:t>Jormag’s</a:t>
+            </a:r>
+            <a:r>
+              <a:rPr lang="en-US" sz="800" dirty="0"/>
+              <a:t> voice has spread. </a:t>
+            </a:r>
+          </a:p>
+          <a:p>
+            <a:r>
+              <a:rPr lang="en-US" sz="800" dirty="0"/>
+              <a:t>19-Garm smells a foul breeze and the spirits seem </a:t>
+            </a:r>
+            <a:r>
+              <a:rPr lang="en-US" sz="800" dirty="0" err="1"/>
+              <a:t>unruley</a:t>
+            </a:r>
+            <a:r>
+              <a:rPr lang="en-US" sz="800" dirty="0"/>
+              <a:t>, it does not </a:t>
+            </a:r>
+            <a:r>
+              <a:rPr lang="en-US" sz="800" dirty="0" err="1"/>
+              <a:t>boad</a:t>
+            </a:r>
+            <a:r>
+              <a:rPr lang="en-US" sz="800" dirty="0"/>
+              <a:t> well for what we will find in Snowden drifts, but all great </a:t>
+            </a:r>
+            <a:r>
+              <a:rPr lang="en-US" sz="800" dirty="0" err="1"/>
+              <a:t>heros</a:t>
+            </a:r>
+            <a:r>
+              <a:rPr lang="en-US" sz="800" dirty="0"/>
+              <a:t> need a challenge. </a:t>
             </a:r>
           </a:p>
         </p:txBody>
@@ -4366,7 +4501,7 @@
         </p:nvSpPr>
         <p:spPr>
           <a:xfrm>
-            <a:off x="1701988" y="2370751"/>
+            <a:off x="1718432" y="2339001"/>
             <a:ext cx="381000" cy="381000"/>
           </a:xfrm>
           <a:prstGeom prst="ellipse">
@@ -4396,7 +4531,7 @@
             <a:pPr algn="ctr"/>
             <a:r>
               <a:rPr lang="en-US" sz="600" dirty="0"/>
-              <a:t>10</a:t>
+              <a:t>11</a:t>
             </a:r>
           </a:p>
         </p:txBody>
@@ -4445,7 +4580,105 @@
             <a:pPr algn="ctr"/>
             <a:r>
               <a:rPr lang="en-US" sz="600" dirty="0"/>
-              <a:t>11</a:t>
+              <a:t>12</a:t>
+            </a:r>
+          </a:p>
+        </p:txBody>
+      </p:sp>
+      <p:sp>
+        <p:nvSpPr>
+          <p:cNvPr id="21" name="Oval 20">
+            <a:extLst>
+              <a:ext uri="{FF2B5EF4-FFF2-40B4-BE49-F238E27FC236}">
+                <a16:creationId xmlns:a16="http://schemas.microsoft.com/office/drawing/2014/main" id="{90E80493-D361-3701-ADB0-41BBD7F0B8E4}"/>
+              </a:ext>
+            </a:extLst>
+          </p:cNvPr>
+          <p:cNvSpPr/>
+          <p:nvPr/>
+        </p:nvSpPr>
+        <p:spPr>
+          <a:xfrm>
+            <a:off x="2728002" y="4921923"/>
+            <a:ext cx="381000" cy="381000"/>
+          </a:xfrm>
+          <a:prstGeom prst="ellipse">
+            <a:avLst/>
+          </a:prstGeom>
+        </p:spPr>
+        <p:style>
+          <a:lnRef idx="2">
+            <a:schemeClr val="accent1">
+              <a:shade val="15000"/>
+            </a:schemeClr>
+          </a:lnRef>
+          <a:fillRef idx="1">
+            <a:schemeClr val="accent1"/>
+          </a:fillRef>
+          <a:effectRef idx="0">
+            <a:schemeClr val="accent1"/>
+          </a:effectRef>
+          <a:fontRef idx="minor">
+            <a:schemeClr val="lt1"/>
+          </a:fontRef>
+        </p:style>
+        <p:txBody>
+          <a:bodyPr rtlCol="0" anchor="ctr"/>
+          <a:lstStyle/>
+          <a:p>
+            <a:pPr algn="ctr"/>
+            <a:r>
+              <a:rPr lang="en-US" sz="600" dirty="0"/>
+              <a:t>5</a:t>
+            </a:r>
+          </a:p>
+        </p:txBody>
+      </p:sp>
+      <p:sp>
+        <p:nvSpPr>
+          <p:cNvPr id="3" name="Oval 2">
+            <a:extLst>
+              <a:ext uri="{FF2B5EF4-FFF2-40B4-BE49-F238E27FC236}">
+                <a16:creationId xmlns:a16="http://schemas.microsoft.com/office/drawing/2014/main" id="{061CDC3D-20DB-B2DE-5F0B-667F6120C57E}"/>
+              </a:ext>
+            </a:extLst>
+          </p:cNvPr>
+          <p:cNvSpPr/>
+          <p:nvPr/>
+        </p:nvSpPr>
+        <p:spPr>
+          <a:xfrm>
+            <a:off x="1945935" y="2031245"/>
+            <a:ext cx="381000" cy="381000"/>
+          </a:xfrm>
+          <a:prstGeom prst="ellipse">
+            <a:avLst/>
+          </a:prstGeom>
+        </p:spPr>
+        <p:style>
+          <a:lnRef idx="2">
+            <a:schemeClr val="accent1">
+              <a:shade val="15000"/>
+            </a:schemeClr>
+          </a:lnRef>
+          <a:fillRef idx="1">
+            <a:schemeClr val="accent1"/>
+          </a:fillRef>
+          <a:effectRef idx="0">
+            <a:schemeClr val="accent1"/>
+          </a:effectRef>
+          <a:fontRef idx="minor">
+            <a:schemeClr val="lt1"/>
+          </a:fontRef>
+        </p:style>
+        <p:txBody>
+          <a:bodyPr rtlCol="0" anchor="ctr"/>
+          <a:lstStyle/>
+          <a:p>
+            <a:pPr algn="ctr"/>
+            <a:r>
+              <a:rPr lang="en-US" sz="600" dirty="0"/>
+              <a:t>13</a:t>
             </a:r>
           </a:p>
         </p:txBody>
@@ -5132,73 +5365,6 @@
         <p:cNvPr id="1" name="">
           <a:extLst>
             <a:ext uri="{FF2B5EF4-FFF2-40B4-BE49-F238E27FC236}">
-              <a16:creationId xmlns:a16="http://schemas.microsoft.com/office/drawing/2014/main" id="{57BF8F38-8129-4C0E-4B44-54848D4A3A97}"/>
-            </a:ext>
-          </a:extLst>
-        </p:cNvPr>
-        <p:cNvGrpSpPr/>
-        <p:nvPr/>
-      </p:nvGrpSpPr>
-      <p:grpSpPr>
-        <a:xfrm>
-          <a:off x="0" y="0"/>
-          <a:ext cx="0" cy="0"/>
-          <a:chOff x="0" y="0"/>
-          <a:chExt cx="0" cy="0"/>
-        </a:xfrm>
-      </p:grpSpPr>
-      <p:pic>
-        <p:nvPicPr>
-          <p:cNvPr id="4" name="Picture 3">
-            <a:extLst>
-              <a:ext uri="{FF2B5EF4-FFF2-40B4-BE49-F238E27FC236}">
-                <a16:creationId xmlns:a16="http://schemas.microsoft.com/office/drawing/2014/main" id="{FC74BFAE-07E9-C045-FBA5-50A812BC23D6}"/>
-              </a:ext>
-            </a:extLst>
-          </p:cNvPr>
-          <p:cNvPicPr>
-            <a:picLocks noChangeAspect="1"/>
-          </p:cNvPicPr>
-          <p:nvPr/>
-        </p:nvPicPr>
-        <p:blipFill>
-          <a:blip r:embed="rId2"/>
-          <a:srcRect l="-10406" r="-188369"/>
-          <a:stretch>
-            <a:fillRect/>
-          </a:stretch>
-        </p:blipFill>
-        <p:spPr>
-          <a:xfrm>
-            <a:off x="800100" y="-667913"/>
-            <a:ext cx="7543801" cy="7525913"/>
-          </a:xfrm>
-          <a:prstGeom prst="rect">
-            <a:avLst/>
-          </a:prstGeom>
-        </p:spPr>
-      </p:pic>
-    </p:spTree>
-    <p:extLst>
-      <p:ext uri="{BB962C8B-B14F-4D97-AF65-F5344CB8AC3E}">
-        <p14:creationId xmlns:p14="http://schemas.microsoft.com/office/powerpoint/2010/main" val="412911330"/>
-      </p:ext>
-    </p:extLst>
-  </p:cSld>
-  <p:clrMapOvr>
-    <a:masterClrMapping/>
-  </p:clrMapOvr>
-</p:sld>
-</file>
-
-<file path=ppt/slides/slide4.xml><?xml version="1.0" encoding="utf-8"?>
-<p:sld xmlns:a="http://schemas.openxmlformats.org/drawingml/2006/main" xmlns:r="http://schemas.openxmlformats.org/officeDocument/2006/relationships" xmlns:p="http://schemas.openxmlformats.org/presentationml/2006/main">
-  <p:cSld>
-    <p:spTree>
-      <p:nvGrpSpPr>
-        <p:cNvPr id="1" name="">
-          <a:extLst>
-            <a:ext uri="{FF2B5EF4-FFF2-40B4-BE49-F238E27FC236}">
               <a16:creationId xmlns:a16="http://schemas.microsoft.com/office/drawing/2014/main" id="{370B4B82-1547-77B1-0EEE-7DD16F243B8D}"/>
             </a:ext>
           </a:extLst>
@@ -5216,10 +5382,10 @@
       </p:grpSpPr>
       <p:pic>
         <p:nvPicPr>
-          <p:cNvPr id="4" name="Picture 3" descr="A video game character with a tiger head&#10;&#10;AI-generated content may be incorrect.">
-            <a:extLst>
-              <a:ext uri="{FF2B5EF4-FFF2-40B4-BE49-F238E27FC236}">
-                <a16:creationId xmlns:a16="http://schemas.microsoft.com/office/drawing/2014/main" id="{057803F0-19C3-76D1-34FC-1496C19FFA1A}"/>
+          <p:cNvPr id="2" name="Picture 1" descr="A person in a armor&#10;&#10;AI-generated content may be incorrect.">
+            <a:extLst>
+              <a:ext uri="{FF2B5EF4-FFF2-40B4-BE49-F238E27FC236}">
+                <a16:creationId xmlns:a16="http://schemas.microsoft.com/office/drawing/2014/main" id="{95633743-4F95-A6EC-18D1-EEE8DAA9DA13}"/>
               </a:ext>
             </a:extLst>
           </p:cNvPr>
@@ -5231,6 +5397,30 @@
         <p:blipFill>
           <a:blip r:embed="rId2">
             <a:extLst>
+              <a:ext uri="{BEBA8EAE-BF5A-486C-A8C5-ECC9F3942E4B}">
+                <a14:imgProps xmlns:a14="http://schemas.microsoft.com/office/drawing/2010/main">
+                  <a14:imgLayer r:embed="rId3">
+                    <a14:imgEffect>
+                      <a14:backgroundRemoval t="10000" b="97407" l="9956" r="89823">
+                        <a14:foregroundMark x1="75442" y1="97407" x2="68363" y2="89907"/>
+                        <a14:foregroundMark x1="68363" y1="89907" x2="67478" y2="74074"/>
+                        <a14:foregroundMark x1="43142" y1="93611" x2="41814" y2="88611"/>
+                        <a14:foregroundMark x1="71999" y1="49734" x2="73451" y2="52685"/>
+                        <a14:foregroundMark x1="70354" y1="46389" x2="71921" y2="49575"/>
+                        <a14:foregroundMark x1="69469" y1="54444" x2="71018" y2="52500"/>
+                        <a14:backgroundMark x1="20354" y1="11111" x2="23673" y2="23611"/>
+                        <a14:backgroundMark x1="66372" y1="50278" x2="60177" y2="43241"/>
+                        <a14:backgroundMark x1="68238" y1="55897" x2="69027" y2="58056"/>
+                        <a14:backgroundMark x1="66150" y1="50185" x2="68237" y2="55896"/>
+                        <a14:backgroundMark x1="68142" y1="49630" x2="67699" y2="52500"/>
+                      </a14:backgroundRemoval>
+                    </a14:imgEffect>
+                    <a14:imgEffect>
+                      <a14:artisticCutout trans="50000" numberOfShades="6"/>
+                    </a14:imgEffect>
+                  </a14:imgLayer>
+                </a14:imgProps>
+              </a:ext>
               <a:ext uri="{28A0092B-C50C-407E-A947-70E740481C1C}">
                 <a14:useLocalDpi xmlns:a14="http://schemas.microsoft.com/office/drawing/2010/main" val="0"/>
               </a:ext>
@@ -5242,20 +5432,23 @@
         </p:blipFill>
         <p:spPr>
           <a:xfrm>
-            <a:off x="6572250" y="0"/>
-            <a:ext cx="5486400" cy="6858000"/>
+            <a:off x="1458262" y="-1592513"/>
+            <a:ext cx="3536696" cy="8450513"/>
           </a:xfrm>
           <a:prstGeom prst="rect">
             <a:avLst/>
           </a:prstGeom>
+          <a:effectLst>
+            <a:softEdge rad="12700"/>
+          </a:effectLst>
         </p:spPr>
       </p:pic>
       <p:pic>
         <p:nvPicPr>
-          <p:cNvPr id="7" name="Picture 6" descr="A video game character in armor&#10;&#10;AI-generated content may be incorrect.">
-            <a:extLst>
-              <a:ext uri="{FF2B5EF4-FFF2-40B4-BE49-F238E27FC236}">
-                <a16:creationId xmlns:a16="http://schemas.microsoft.com/office/drawing/2014/main" id="{7F0CD694-5062-E600-99DD-1D7920ED48A6}"/>
+          <p:cNvPr id="3" name="Picture 2">
+            <a:extLst>
+              <a:ext uri="{FF2B5EF4-FFF2-40B4-BE49-F238E27FC236}">
+                <a16:creationId xmlns:a16="http://schemas.microsoft.com/office/drawing/2014/main" id="{698ED63C-A70C-4615-16DC-7069C233B158}"/>
               </a:ext>
             </a:extLst>
           </p:cNvPr>
@@ -5265,10 +5458,32 @@
           <p:nvPr/>
         </p:nvPicPr>
         <p:blipFill>
-          <a:blip r:embed="rId3">
-            <a:extLst>
-              <a:ext uri="{28A0092B-C50C-407E-A947-70E740481C1C}">
-                <a14:useLocalDpi xmlns:a14="http://schemas.microsoft.com/office/drawing/2010/main" val="0"/>
+          <a:blip r:embed="rId4">
+            <a:extLst>
+              <a:ext uri="{BEBA8EAE-BF5A-486C-A8C5-ECC9F3942E4B}">
+                <a14:imgProps xmlns:a14="http://schemas.microsoft.com/office/drawing/2010/main">
+                  <a14:imgLayer r:embed="rId5">
+                    <a14:imgEffect>
+                      <a14:backgroundRemoval t="8360" b="96215" l="6870" r="94275">
+                        <a14:foregroundMark x1="94275" y1="48580" x2="87405" y2="45110"/>
+                        <a14:foregroundMark x1="63359" y1="15773" x2="53435" y2="8675"/>
+                        <a14:foregroundMark x1="53435" y1="8675" x2="44656" y2="15300"/>
+                        <a14:foregroundMark x1="44656" y1="15300" x2="45038" y2="15615"/>
+                        <a14:foregroundMark x1="15649" y1="65457" x2="20611" y2="61514"/>
+                        <a14:foregroundMark x1="14122" y1="67350" x2="16031" y2="65457"/>
+                        <a14:foregroundMark x1="13740" y1="94322" x2="22137" y2="87855"/>
+                        <a14:foregroundMark x1="72137" y1="96372" x2="63359" y2="92744"/>
+                        <a14:foregroundMark x1="6870" y1="86120" x2="9542" y2="81861"/>
+                      </a14:backgroundRemoval>
+                    </a14:imgEffect>
+                    <a14:imgEffect>
+                      <a14:artisticCutout trans="80000" numberOfShades="6"/>
+                    </a14:imgEffect>
+                    <a14:imgEffect>
+                      <a14:brightnessContrast bright="20000" contrast="-20000"/>
+                    </a14:imgEffect>
+                  </a14:imgLayer>
+                </a14:imgProps>
               </a:ext>
             </a:extLst>
           </a:blip>
@@ -5278,42 +5493,15 @@
         </p:blipFill>
         <p:spPr>
           <a:xfrm>
-            <a:off x="0" y="0"/>
-            <a:ext cx="4119942" cy="6858000"/>
+            <a:off x="8445006" y="262919"/>
+            <a:ext cx="2725412" cy="6595081"/>
           </a:xfrm>
           <a:prstGeom prst="rect">
             <a:avLst/>
           </a:prstGeom>
-        </p:spPr>
-      </p:pic>
-      <p:pic>
-        <p:nvPicPr>
-          <p:cNvPr id="6" name="Picture 5">
-            <a:extLst>
-              <a:ext uri="{FF2B5EF4-FFF2-40B4-BE49-F238E27FC236}">
-                <a16:creationId xmlns:a16="http://schemas.microsoft.com/office/drawing/2014/main" id="{E28CDC61-5390-EF0D-674E-5B478CCCE382}"/>
-              </a:ext>
-            </a:extLst>
-          </p:cNvPr>
-          <p:cNvPicPr>
-            <a:picLocks noChangeAspect="1"/>
-          </p:cNvPicPr>
-          <p:nvPr/>
-        </p:nvPicPr>
-        <p:blipFill>
-          <a:blip r:embed="rId4"/>
-          <a:stretch>
-            <a:fillRect/>
-          </a:stretch>
-        </p:blipFill>
-        <p:spPr>
-          <a:xfrm>
-            <a:off x="4012596" y="262919"/>
-            <a:ext cx="2725412" cy="6595081"/>
-          </a:xfrm>
-          <a:prstGeom prst="rect">
-            <a:avLst/>
-          </a:prstGeom>
+          <a:effectLst>
+            <a:softEdge rad="12700"/>
+          </a:effectLst>
         </p:spPr>
       </p:pic>
     </p:spTree>
@@ -5329,7 +5517,7 @@
 </p:sld>
 </file>
 
-<file path=ppt/slides/slide5.xml><?xml version="1.0" encoding="utf-8"?>
+<file path=ppt/slides/slide4.xml><?xml version="1.0" encoding="utf-8"?>
 <p:sld xmlns:a="http://schemas.openxmlformats.org/drawingml/2006/main" xmlns:r="http://schemas.openxmlformats.org/officeDocument/2006/relationships" xmlns:p="http://schemas.openxmlformats.org/presentationml/2006/main">
   <p:cSld>
     <p:spTree>

</xml_diff>